<commit_message>
Update proposal PDF and slides
</commit_message>
<xml_diff>
--- a/docs/Tiny AI Hardware.pptx
+++ b/docs/Tiny AI Hardware.pptx
@@ -4,9 +4,13 @@
   <p:sldMasterIdLst>
     <p:sldMasterId id="2147483648" r:id="rId1"/>
   </p:sldMasterIdLst>
+  <p:notesMasterIdLst>
+    <p:notesMasterId r:id="rId5"/>
+  </p:notesMasterIdLst>
   <p:sldIdLst>
     <p:sldId id="256" r:id="rId2"/>
-    <p:sldId id="257" r:id="rId3"/>
+    <p:sldId id="259" r:id="rId3"/>
+    <p:sldId id="260" r:id="rId4"/>
   </p:sldIdLst>
   <p:sldSz cx="12192000" cy="6858000"/>
   <p:notesSz cx="6858000" cy="9144000"/>
@@ -105,7 +109,695 @@
       </a:defRPr>
     </a:lvl9pPr>
   </p:defaultTextStyle>
+  <p:extLst>
+    <p:ext uri="{EFAFB233-063F-42B5-8137-9DF3F51BA10A}">
+      <p15:sldGuideLst xmlns:p15="http://schemas.microsoft.com/office/powerpoint/2012/main"/>
+    </p:ext>
+  </p:extLst>
 </p:presentation>
+</file>
+
+<file path=ppt/notesMasters/notesMaster1.xml><?xml version="1.0" encoding="utf-8"?>
+<p:notesMaster xmlns:a="http://schemas.openxmlformats.org/drawingml/2006/main" xmlns:r="http://schemas.openxmlformats.org/officeDocument/2006/relationships" xmlns:p="http://schemas.openxmlformats.org/presentationml/2006/main">
+  <p:cSld>
+    <p:bg>
+      <p:bgRef idx="1001">
+        <a:schemeClr val="bg1"/>
+      </p:bgRef>
+    </p:bg>
+    <p:spTree>
+      <p:nvGrpSpPr>
+        <p:cNvPr id="1" name=""/>
+        <p:cNvGrpSpPr/>
+        <p:nvPr/>
+      </p:nvGrpSpPr>
+      <p:grpSpPr>
+        <a:xfrm>
+          <a:off x="0" y="0"/>
+          <a:ext cx="0" cy="0"/>
+          <a:chOff x="0" y="0"/>
+          <a:chExt cx="0" cy="0"/>
+        </a:xfrm>
+      </p:grpSpPr>
+      <p:sp>
+        <p:nvSpPr>
+          <p:cNvPr id="2" name="页眉占位符 1"/>
+          <p:cNvSpPr>
+            <a:spLocks noGrp="1"/>
+          </p:cNvSpPr>
+          <p:nvPr>
+            <p:ph type="hdr" sz="quarter"/>
+          </p:nvPr>
+        </p:nvSpPr>
+        <p:spPr>
+          <a:xfrm>
+            <a:off x="0" y="0"/>
+            <a:ext cx="2971800" cy="458788"/>
+          </a:xfrm>
+          <a:prstGeom prst="rect">
+            <a:avLst/>
+          </a:prstGeom>
+        </p:spPr>
+        <p:txBody>
+          <a:bodyPr vert="horz" lIns="91440" tIns="45720" rIns="91440" bIns="45720" rtlCol="0"/>
+          <a:lstStyle>
+            <a:lvl1pPr algn="l">
+              <a:defRPr sz="1200"/>
+            </a:lvl1pPr>
+          </a:lstStyle>
+          <a:p>
+            <a:endParaRPr lang="zh-CN" altLang="en-US"/>
+          </a:p>
+        </p:txBody>
+      </p:sp>
+      <p:sp>
+        <p:nvSpPr>
+          <p:cNvPr id="3" name="日期占位符 2"/>
+          <p:cNvSpPr>
+            <a:spLocks noGrp="1"/>
+          </p:cNvSpPr>
+          <p:nvPr>
+            <p:ph type="dt" idx="1"/>
+          </p:nvPr>
+        </p:nvSpPr>
+        <p:spPr>
+          <a:xfrm>
+            <a:off x="3884613" y="0"/>
+            <a:ext cx="2971800" cy="458788"/>
+          </a:xfrm>
+          <a:prstGeom prst="rect">
+            <a:avLst/>
+          </a:prstGeom>
+        </p:spPr>
+        <p:txBody>
+          <a:bodyPr vert="horz" lIns="91440" tIns="45720" rIns="91440" bIns="45720" rtlCol="0"/>
+          <a:lstStyle>
+            <a:lvl1pPr algn="r">
+              <a:defRPr sz="1200"/>
+            </a:lvl1pPr>
+          </a:lstStyle>
+          <a:p>
+            <a:fld id="{635EA2FC-43B9-43B3-AB7E-0342B28E8513}" type="datetimeFigureOut">
+              <a:rPr lang="zh-CN" altLang="en-US" smtClean="0"/>
+              <a:t>2025/11/6</a:t>
+            </a:fld>
+            <a:endParaRPr lang="zh-CN" altLang="en-US"/>
+          </a:p>
+        </p:txBody>
+      </p:sp>
+      <p:sp>
+        <p:nvSpPr>
+          <p:cNvPr id="4" name="幻灯片图像占位符 3"/>
+          <p:cNvSpPr>
+            <a:spLocks noGrp="1" noRot="1" noChangeAspect="1"/>
+          </p:cNvSpPr>
+          <p:nvPr>
+            <p:ph type="sldImg" idx="2"/>
+          </p:nvPr>
+        </p:nvSpPr>
+        <p:spPr>
+          <a:xfrm>
+            <a:off x="685800" y="1143000"/>
+            <a:ext cx="5486400" cy="3086100"/>
+          </a:xfrm>
+          <a:prstGeom prst="rect">
+            <a:avLst/>
+          </a:prstGeom>
+          <a:noFill/>
+          <a:ln w="12700">
+            <a:solidFill>
+              <a:prstClr val="black"/>
+            </a:solidFill>
+          </a:ln>
+        </p:spPr>
+        <p:txBody>
+          <a:bodyPr vert="horz" lIns="91440" tIns="45720" rIns="91440" bIns="45720" rtlCol="0" anchor="ctr"/>
+          <a:lstStyle/>
+          <a:p>
+            <a:endParaRPr lang="zh-CN" altLang="en-US"/>
+          </a:p>
+        </p:txBody>
+      </p:sp>
+      <p:sp>
+        <p:nvSpPr>
+          <p:cNvPr id="5" name="备注占位符 4"/>
+          <p:cNvSpPr>
+            <a:spLocks noGrp="1"/>
+          </p:cNvSpPr>
+          <p:nvPr>
+            <p:ph type="body" sz="quarter" idx="3"/>
+          </p:nvPr>
+        </p:nvSpPr>
+        <p:spPr>
+          <a:xfrm>
+            <a:off x="685800" y="4400550"/>
+            <a:ext cx="5486400" cy="3600450"/>
+          </a:xfrm>
+          <a:prstGeom prst="rect">
+            <a:avLst/>
+          </a:prstGeom>
+        </p:spPr>
+        <p:txBody>
+          <a:bodyPr vert="horz" lIns="91440" tIns="45720" rIns="91440" bIns="45720" rtlCol="0"/>
+          <a:lstStyle/>
+          <a:p>
+            <a:pPr lvl="0"/>
+            <a:r>
+              <a:rPr lang="zh-CN" altLang="en-US"/>
+              <a:t>单击此处编辑母版文本样式</a:t>
+            </a:r>
+          </a:p>
+          <a:p>
+            <a:pPr lvl="1"/>
+            <a:r>
+              <a:rPr lang="zh-CN" altLang="en-US"/>
+              <a:t>二级</a:t>
+            </a:r>
+          </a:p>
+          <a:p>
+            <a:pPr lvl="2"/>
+            <a:r>
+              <a:rPr lang="zh-CN" altLang="en-US"/>
+              <a:t>三级</a:t>
+            </a:r>
+          </a:p>
+          <a:p>
+            <a:pPr lvl="3"/>
+            <a:r>
+              <a:rPr lang="zh-CN" altLang="en-US"/>
+              <a:t>四级</a:t>
+            </a:r>
+          </a:p>
+          <a:p>
+            <a:pPr lvl="4"/>
+            <a:r>
+              <a:rPr lang="zh-CN" altLang="en-US"/>
+              <a:t>五级</a:t>
+            </a:r>
+          </a:p>
+        </p:txBody>
+      </p:sp>
+      <p:sp>
+        <p:nvSpPr>
+          <p:cNvPr id="6" name="页脚占位符 5"/>
+          <p:cNvSpPr>
+            <a:spLocks noGrp="1"/>
+          </p:cNvSpPr>
+          <p:nvPr>
+            <p:ph type="ftr" sz="quarter" idx="4"/>
+          </p:nvPr>
+        </p:nvSpPr>
+        <p:spPr>
+          <a:xfrm>
+            <a:off x="0" y="8685213"/>
+            <a:ext cx="2971800" cy="458787"/>
+          </a:xfrm>
+          <a:prstGeom prst="rect">
+            <a:avLst/>
+          </a:prstGeom>
+        </p:spPr>
+        <p:txBody>
+          <a:bodyPr vert="horz" lIns="91440" tIns="45720" rIns="91440" bIns="45720" rtlCol="0" anchor="b"/>
+          <a:lstStyle>
+            <a:lvl1pPr algn="l">
+              <a:defRPr sz="1200"/>
+            </a:lvl1pPr>
+          </a:lstStyle>
+          <a:p>
+            <a:endParaRPr lang="zh-CN" altLang="en-US"/>
+          </a:p>
+        </p:txBody>
+      </p:sp>
+      <p:sp>
+        <p:nvSpPr>
+          <p:cNvPr id="7" name="灯片编号占位符 6"/>
+          <p:cNvSpPr>
+            <a:spLocks noGrp="1"/>
+          </p:cNvSpPr>
+          <p:nvPr>
+            <p:ph type="sldNum" sz="quarter" idx="5"/>
+          </p:nvPr>
+        </p:nvSpPr>
+        <p:spPr>
+          <a:xfrm>
+            <a:off x="3884613" y="8685213"/>
+            <a:ext cx="2971800" cy="458787"/>
+          </a:xfrm>
+          <a:prstGeom prst="rect">
+            <a:avLst/>
+          </a:prstGeom>
+        </p:spPr>
+        <p:txBody>
+          <a:bodyPr vert="horz" lIns="91440" tIns="45720" rIns="91440" bIns="45720" rtlCol="0" anchor="b"/>
+          <a:lstStyle>
+            <a:lvl1pPr algn="r">
+              <a:defRPr sz="1200"/>
+            </a:lvl1pPr>
+          </a:lstStyle>
+          <a:p>
+            <a:fld id="{ADEE4151-9929-491B-87E3-EA1AE87BC99C}" type="slidenum">
+              <a:rPr lang="zh-CN" altLang="en-US" smtClean="0"/>
+              <a:t>‹#›</a:t>
+            </a:fld>
+            <a:endParaRPr lang="zh-CN" altLang="en-US"/>
+          </a:p>
+        </p:txBody>
+      </p:sp>
+    </p:spTree>
+    <p:extLst>
+      <p:ext uri="{BB962C8B-B14F-4D97-AF65-F5344CB8AC3E}">
+        <p14:creationId xmlns:p14="http://schemas.microsoft.com/office/powerpoint/2010/main" val="1932736893"/>
+      </p:ext>
+    </p:extLst>
+  </p:cSld>
+  <p:clrMap bg1="lt1" tx1="dk1" bg2="lt2" tx2="dk2" accent1="accent1" accent2="accent2" accent3="accent3" accent4="accent4" accent5="accent5" accent6="accent6" hlink="hlink" folHlink="folHlink"/>
+  <p:notesStyle>
+    <a:lvl1pPr marL="0" algn="l" defTabSz="914400" rtl="0" eaLnBrk="1" latinLnBrk="0" hangingPunct="1">
+      <a:defRPr sz="1200" kern="1200">
+        <a:solidFill>
+          <a:schemeClr val="tx1"/>
+        </a:solidFill>
+        <a:latin typeface="+mn-lt"/>
+        <a:ea typeface="+mn-ea"/>
+        <a:cs typeface="+mn-cs"/>
+      </a:defRPr>
+    </a:lvl1pPr>
+    <a:lvl2pPr marL="457200" algn="l" defTabSz="914400" rtl="0" eaLnBrk="1" latinLnBrk="0" hangingPunct="1">
+      <a:defRPr sz="1200" kern="1200">
+        <a:solidFill>
+          <a:schemeClr val="tx1"/>
+        </a:solidFill>
+        <a:latin typeface="+mn-lt"/>
+        <a:ea typeface="+mn-ea"/>
+        <a:cs typeface="+mn-cs"/>
+      </a:defRPr>
+    </a:lvl2pPr>
+    <a:lvl3pPr marL="914400" algn="l" defTabSz="914400" rtl="0" eaLnBrk="1" latinLnBrk="0" hangingPunct="1">
+      <a:defRPr sz="1200" kern="1200">
+        <a:solidFill>
+          <a:schemeClr val="tx1"/>
+        </a:solidFill>
+        <a:latin typeface="+mn-lt"/>
+        <a:ea typeface="+mn-ea"/>
+        <a:cs typeface="+mn-cs"/>
+      </a:defRPr>
+    </a:lvl3pPr>
+    <a:lvl4pPr marL="1371600" algn="l" defTabSz="914400" rtl="0" eaLnBrk="1" latinLnBrk="0" hangingPunct="1">
+      <a:defRPr sz="1200" kern="1200">
+        <a:solidFill>
+          <a:schemeClr val="tx1"/>
+        </a:solidFill>
+        <a:latin typeface="+mn-lt"/>
+        <a:ea typeface="+mn-ea"/>
+        <a:cs typeface="+mn-cs"/>
+      </a:defRPr>
+    </a:lvl4pPr>
+    <a:lvl5pPr marL="1828800" algn="l" defTabSz="914400" rtl="0" eaLnBrk="1" latinLnBrk="0" hangingPunct="1">
+      <a:defRPr sz="1200" kern="1200">
+        <a:solidFill>
+          <a:schemeClr val="tx1"/>
+        </a:solidFill>
+        <a:latin typeface="+mn-lt"/>
+        <a:ea typeface="+mn-ea"/>
+        <a:cs typeface="+mn-cs"/>
+      </a:defRPr>
+    </a:lvl5pPr>
+    <a:lvl6pPr marL="2286000" algn="l" defTabSz="914400" rtl="0" eaLnBrk="1" latinLnBrk="0" hangingPunct="1">
+      <a:defRPr sz="1200" kern="1200">
+        <a:solidFill>
+          <a:schemeClr val="tx1"/>
+        </a:solidFill>
+        <a:latin typeface="+mn-lt"/>
+        <a:ea typeface="+mn-ea"/>
+        <a:cs typeface="+mn-cs"/>
+      </a:defRPr>
+    </a:lvl6pPr>
+    <a:lvl7pPr marL="2743200" algn="l" defTabSz="914400" rtl="0" eaLnBrk="1" latinLnBrk="0" hangingPunct="1">
+      <a:defRPr sz="1200" kern="1200">
+        <a:solidFill>
+          <a:schemeClr val="tx1"/>
+        </a:solidFill>
+        <a:latin typeface="+mn-lt"/>
+        <a:ea typeface="+mn-ea"/>
+        <a:cs typeface="+mn-cs"/>
+      </a:defRPr>
+    </a:lvl7pPr>
+    <a:lvl8pPr marL="3200400" algn="l" defTabSz="914400" rtl="0" eaLnBrk="1" latinLnBrk="0" hangingPunct="1">
+      <a:defRPr sz="1200" kern="1200">
+        <a:solidFill>
+          <a:schemeClr val="tx1"/>
+        </a:solidFill>
+        <a:latin typeface="+mn-lt"/>
+        <a:ea typeface="+mn-ea"/>
+        <a:cs typeface="+mn-cs"/>
+      </a:defRPr>
+    </a:lvl8pPr>
+    <a:lvl9pPr marL="3657600" algn="l" defTabSz="914400" rtl="0" eaLnBrk="1" latinLnBrk="0" hangingPunct="1">
+      <a:defRPr sz="1200" kern="1200">
+        <a:solidFill>
+          <a:schemeClr val="tx1"/>
+        </a:solidFill>
+        <a:latin typeface="+mn-lt"/>
+        <a:ea typeface="+mn-ea"/>
+        <a:cs typeface="+mn-cs"/>
+      </a:defRPr>
+    </a:lvl9pPr>
+  </p:notesStyle>
+</p:notesMaster>
+</file>
+
+<file path=ppt/notesSlides/notesSlide1.xml><?xml version="1.0" encoding="utf-8"?>
+<p:notes xmlns:a="http://schemas.openxmlformats.org/drawingml/2006/main" xmlns:r="http://schemas.openxmlformats.org/officeDocument/2006/relationships" xmlns:p="http://schemas.openxmlformats.org/presentationml/2006/main">
+  <p:cSld>
+    <p:spTree>
+      <p:nvGrpSpPr>
+        <p:cNvPr id="1" name=""/>
+        <p:cNvGrpSpPr/>
+        <p:nvPr/>
+      </p:nvGrpSpPr>
+      <p:grpSpPr>
+        <a:xfrm>
+          <a:off x="0" y="0"/>
+          <a:ext cx="0" cy="0"/>
+          <a:chOff x="0" y="0"/>
+          <a:chExt cx="0" cy="0"/>
+        </a:xfrm>
+      </p:grpSpPr>
+      <p:sp>
+        <p:nvSpPr>
+          <p:cNvPr id="2" name="幻灯片图像占位符 1"/>
+          <p:cNvSpPr>
+            <a:spLocks noGrp="1" noRot="1" noChangeAspect="1"/>
+          </p:cNvSpPr>
+          <p:nvPr>
+            <p:ph type="sldImg"/>
+          </p:nvPr>
+        </p:nvSpPr>
+        <p:spPr/>
+      </p:sp>
+      <p:sp>
+        <p:nvSpPr>
+          <p:cNvPr id="3" name="备注占位符 2"/>
+          <p:cNvSpPr>
+            <a:spLocks noGrp="1"/>
+          </p:cNvSpPr>
+          <p:nvPr>
+            <p:ph type="body" idx="1"/>
+          </p:nvPr>
+        </p:nvSpPr>
+        <p:spPr/>
+        <p:txBody>
+          <a:bodyPr/>
+          <a:lstStyle/>
+          <a:p>
+            <a:r>
+              <a:rPr lang="en-US" altLang="zh-CN" dirty="0"/>
+              <a:t>Hi everyone, I</a:t>
+            </a:r>
+            <a:r>
+              <a:rPr lang="zh-CN" altLang="en-US" dirty="0"/>
+              <a:t>‘</a:t>
+            </a:r>
+            <a:r>
+              <a:rPr lang="en-US" altLang="zh-CN" dirty="0"/>
+              <a:t>m Yi Deng. Title is </a:t>
+            </a:r>
+            <a:r>
+              <a:rPr lang="en-US" altLang="zh-CN" sz="1200" dirty="0">
+                <a:latin typeface="Arial" panose="020B0604020202020204" pitchFamily="34" charset="0"/>
+                <a:cs typeface="Arial" panose="020B0604020202020204" pitchFamily="34" charset="0"/>
+              </a:rPr>
+              <a:t>Hand Gesture Recognition on an Embedded Vision System.</a:t>
+            </a:r>
+            <a:r>
+              <a:rPr lang="zh-CN" altLang="en-US" sz="1200" dirty="0">
+                <a:latin typeface="Arial" panose="020B0604020202020204" pitchFamily="34" charset="0"/>
+                <a:cs typeface="Arial" panose="020B0604020202020204" pitchFamily="34" charset="0"/>
+              </a:rPr>
+              <a:t> </a:t>
+            </a:r>
+            <a:r>
+              <a:rPr lang="en-US" altLang="zh-CN" dirty="0"/>
+              <a:t>this project focuses on building a real-time hand gesture recognition system on the </a:t>
+            </a:r>
+            <a:r>
+              <a:rPr lang="en-US" altLang="zh-CN" dirty="0" err="1"/>
+              <a:t>OpenMV</a:t>
+            </a:r>
+            <a:r>
+              <a:rPr lang="en-US" altLang="zh-CN" dirty="0"/>
+              <a:t> H7 platform.</a:t>
+            </a:r>
+            <a:endParaRPr lang="zh-CN" altLang="en-US" dirty="0"/>
+          </a:p>
+        </p:txBody>
+      </p:sp>
+      <p:sp>
+        <p:nvSpPr>
+          <p:cNvPr id="4" name="灯片编号占位符 3"/>
+          <p:cNvSpPr>
+            <a:spLocks noGrp="1"/>
+          </p:cNvSpPr>
+          <p:nvPr>
+            <p:ph type="sldNum" sz="quarter" idx="5"/>
+          </p:nvPr>
+        </p:nvSpPr>
+        <p:spPr/>
+        <p:txBody>
+          <a:bodyPr/>
+          <a:lstStyle/>
+          <a:p>
+            <a:fld id="{ADEE4151-9929-491B-87E3-EA1AE87BC99C}" type="slidenum">
+              <a:rPr lang="zh-CN" altLang="en-US" smtClean="0"/>
+              <a:t>1</a:t>
+            </a:fld>
+            <a:endParaRPr lang="zh-CN" altLang="en-US"/>
+          </a:p>
+        </p:txBody>
+      </p:sp>
+    </p:spTree>
+    <p:extLst>
+      <p:ext uri="{BB962C8B-B14F-4D97-AF65-F5344CB8AC3E}">
+        <p14:creationId xmlns:p14="http://schemas.microsoft.com/office/powerpoint/2010/main" val="1196866958"/>
+      </p:ext>
+    </p:extLst>
+  </p:cSld>
+  <p:clrMapOvr>
+    <a:masterClrMapping/>
+  </p:clrMapOvr>
+</p:notes>
+</file>
+
+<file path=ppt/notesSlides/notesSlide2.xml><?xml version="1.0" encoding="utf-8"?>
+<p:notes xmlns:a="http://schemas.openxmlformats.org/drawingml/2006/main" xmlns:r="http://schemas.openxmlformats.org/officeDocument/2006/relationships" xmlns:p="http://schemas.openxmlformats.org/presentationml/2006/main">
+  <p:cSld>
+    <p:spTree>
+      <p:nvGrpSpPr>
+        <p:cNvPr id="1" name=""/>
+        <p:cNvGrpSpPr/>
+        <p:nvPr/>
+      </p:nvGrpSpPr>
+      <p:grpSpPr>
+        <a:xfrm>
+          <a:off x="0" y="0"/>
+          <a:ext cx="0" cy="0"/>
+          <a:chOff x="0" y="0"/>
+          <a:chExt cx="0" cy="0"/>
+        </a:xfrm>
+      </p:grpSpPr>
+      <p:sp>
+        <p:nvSpPr>
+          <p:cNvPr id="2" name="幻灯片图像占位符 1"/>
+          <p:cNvSpPr>
+            <a:spLocks noGrp="1" noRot="1" noChangeAspect="1"/>
+          </p:cNvSpPr>
+          <p:nvPr>
+            <p:ph type="sldImg"/>
+          </p:nvPr>
+        </p:nvSpPr>
+        <p:spPr/>
+      </p:sp>
+      <p:sp>
+        <p:nvSpPr>
+          <p:cNvPr id="3" name="备注占位符 2"/>
+          <p:cNvSpPr>
+            <a:spLocks noGrp="1"/>
+          </p:cNvSpPr>
+          <p:nvPr>
+            <p:ph type="body" idx="1"/>
+          </p:nvPr>
+        </p:nvSpPr>
+        <p:spPr/>
+        <p:txBody>
+          <a:bodyPr/>
+          <a:lstStyle/>
+          <a:p>
+            <a:r>
+              <a:rPr lang="en-US" altLang="zh-CN" dirty="0"/>
+              <a:t>Gesture interaction is widely used in wearable devices and small robots.</a:t>
+            </a:r>
+            <a:br>
+              <a:rPr lang="en-US" altLang="zh-CN" dirty="0"/>
+            </a:br>
+            <a:r>
+              <a:rPr lang="en-US" altLang="zh-CN" dirty="0"/>
+              <a:t>However, most systems rely on GPUs or cloud inference, which increases latency and raises privacy concerns.</a:t>
+            </a:r>
+            <a:br>
+              <a:rPr lang="en-US" altLang="zh-CN" dirty="0"/>
+            </a:br>
+            <a:r>
+              <a:rPr lang="en-US" altLang="zh-CN" dirty="0"/>
+              <a:t>My goal is to show that useful vision-based gesture recognition can run directly on microcontroller hardware, without network support.</a:t>
+            </a:r>
+            <a:endParaRPr lang="zh-CN" altLang="en-US" dirty="0"/>
+          </a:p>
+        </p:txBody>
+      </p:sp>
+      <p:sp>
+        <p:nvSpPr>
+          <p:cNvPr id="4" name="灯片编号占位符 3"/>
+          <p:cNvSpPr>
+            <a:spLocks noGrp="1"/>
+          </p:cNvSpPr>
+          <p:nvPr>
+            <p:ph type="sldNum" sz="quarter" idx="5"/>
+          </p:nvPr>
+        </p:nvSpPr>
+        <p:spPr/>
+        <p:txBody>
+          <a:bodyPr/>
+          <a:lstStyle/>
+          <a:p>
+            <a:fld id="{ADEE4151-9929-491B-87E3-EA1AE87BC99C}" type="slidenum">
+              <a:rPr lang="zh-CN" altLang="en-US" smtClean="0"/>
+              <a:t>2</a:t>
+            </a:fld>
+            <a:endParaRPr lang="zh-CN" altLang="en-US"/>
+          </a:p>
+        </p:txBody>
+      </p:sp>
+    </p:spTree>
+    <p:extLst>
+      <p:ext uri="{BB962C8B-B14F-4D97-AF65-F5344CB8AC3E}">
+        <p14:creationId xmlns:p14="http://schemas.microsoft.com/office/powerpoint/2010/main" val="3256083099"/>
+      </p:ext>
+    </p:extLst>
+  </p:cSld>
+  <p:clrMapOvr>
+    <a:masterClrMapping/>
+  </p:clrMapOvr>
+</p:notes>
+</file>
+
+<file path=ppt/notesSlides/notesSlide3.xml><?xml version="1.0" encoding="utf-8"?>
+<p:notes xmlns:a="http://schemas.openxmlformats.org/drawingml/2006/main" xmlns:r="http://schemas.openxmlformats.org/officeDocument/2006/relationships" xmlns:p="http://schemas.openxmlformats.org/presentationml/2006/main">
+  <p:cSld>
+    <p:spTree>
+      <p:nvGrpSpPr>
+        <p:cNvPr id="1" name=""/>
+        <p:cNvGrpSpPr/>
+        <p:nvPr/>
+      </p:nvGrpSpPr>
+      <p:grpSpPr>
+        <a:xfrm>
+          <a:off x="0" y="0"/>
+          <a:ext cx="0" cy="0"/>
+          <a:chOff x="0" y="0"/>
+          <a:chExt cx="0" cy="0"/>
+        </a:xfrm>
+      </p:grpSpPr>
+      <p:sp>
+        <p:nvSpPr>
+          <p:cNvPr id="2" name="幻灯片图像占位符 1"/>
+          <p:cNvSpPr>
+            <a:spLocks noGrp="1" noRot="1" noChangeAspect="1"/>
+          </p:cNvSpPr>
+          <p:nvPr>
+            <p:ph type="sldImg"/>
+          </p:nvPr>
+        </p:nvSpPr>
+        <p:spPr/>
+      </p:sp>
+      <p:sp>
+        <p:nvSpPr>
+          <p:cNvPr id="3" name="备注占位符 2"/>
+          <p:cNvSpPr>
+            <a:spLocks noGrp="1"/>
+          </p:cNvSpPr>
+          <p:nvPr>
+            <p:ph type="body" idx="1"/>
+          </p:nvPr>
+        </p:nvSpPr>
+        <p:spPr/>
+        <p:txBody>
+          <a:bodyPr/>
+          <a:lstStyle/>
+          <a:p>
+            <a:r>
+              <a:rPr lang="en-US" altLang="zh-CN" dirty="0"/>
+              <a:t>The camera captures the hand region, and a quantized </a:t>
+            </a:r>
+            <a:r>
+              <a:rPr lang="en-US" altLang="zh-CN" dirty="0" err="1"/>
+              <a:t>TinyML</a:t>
+            </a:r>
+            <a:r>
+              <a:rPr lang="en-US" altLang="zh-CN" dirty="0"/>
+              <a:t> model classifies the gesture on the microcontroller.</a:t>
+            </a:r>
+            <a:br>
+              <a:rPr lang="en-US" altLang="zh-CN" dirty="0"/>
+            </a:br>
+            <a:r>
+              <a:rPr lang="en-US" altLang="zh-CN" dirty="0"/>
+              <a:t>The system will detect at least three basic gestures and give immediate feedback such as LED or buzzer control.</a:t>
+            </a:r>
+            <a:br>
+              <a:rPr lang="en-US" altLang="zh-CN" dirty="0"/>
+            </a:br>
+            <a:r>
+              <a:rPr lang="en-US" altLang="zh-CN" dirty="0"/>
+              <a:t>The performance targets include at least 10 frames per second and keeping the model size under 500 KB so it fits into memory.</a:t>
+            </a:r>
+            <a:endParaRPr lang="zh-CN" altLang="en-US" dirty="0"/>
+          </a:p>
+        </p:txBody>
+      </p:sp>
+      <p:sp>
+        <p:nvSpPr>
+          <p:cNvPr id="4" name="灯片编号占位符 3"/>
+          <p:cNvSpPr>
+            <a:spLocks noGrp="1"/>
+          </p:cNvSpPr>
+          <p:nvPr>
+            <p:ph type="sldNum" sz="quarter" idx="5"/>
+          </p:nvPr>
+        </p:nvSpPr>
+        <p:spPr/>
+        <p:txBody>
+          <a:bodyPr/>
+          <a:lstStyle/>
+          <a:p>
+            <a:fld id="{ADEE4151-9929-491B-87E3-EA1AE87BC99C}" type="slidenum">
+              <a:rPr lang="zh-CN" altLang="en-US" smtClean="0"/>
+              <a:t>3</a:t>
+            </a:fld>
+            <a:endParaRPr lang="zh-CN" altLang="en-US"/>
+          </a:p>
+        </p:txBody>
+      </p:sp>
+    </p:spTree>
+    <p:extLst>
+      <p:ext uri="{BB962C8B-B14F-4D97-AF65-F5344CB8AC3E}">
+        <p14:creationId xmlns:p14="http://schemas.microsoft.com/office/powerpoint/2010/main" val="2106051230"/>
+      </p:ext>
+    </p:extLst>
+  </p:cSld>
+  <p:clrMapOvr>
+    <a:masterClrMapping/>
+  </p:clrMapOvr>
+</p:notes>
 </file>
 
 <file path=ppt/slideLayouts/slideLayout1.xml><?xml version="1.0" encoding="utf-8"?>
@@ -255,7 +947,7 @@
           <a:p>
             <a:fld id="{FE49BBF5-53D3-44FC-8C3B-D3DD809837B3}" type="datetimeFigureOut">
               <a:rPr lang="zh-CN" altLang="en-US" smtClean="0"/>
-              <a:t>2025/11/5</a:t>
+              <a:t>2025/11/6</a:t>
             </a:fld>
             <a:endParaRPr lang="zh-CN" altLang="en-US"/>
           </a:p>
@@ -453,7 +1145,7 @@
           <a:p>
             <a:fld id="{FE49BBF5-53D3-44FC-8C3B-D3DD809837B3}" type="datetimeFigureOut">
               <a:rPr lang="zh-CN" altLang="en-US" smtClean="0"/>
-              <a:t>2025/11/5</a:t>
+              <a:t>2025/11/6</a:t>
             </a:fld>
             <a:endParaRPr lang="zh-CN" altLang="en-US"/>
           </a:p>
@@ -661,7 +1353,7 @@
           <a:p>
             <a:fld id="{FE49BBF5-53D3-44FC-8C3B-D3DD809837B3}" type="datetimeFigureOut">
               <a:rPr lang="zh-CN" altLang="en-US" smtClean="0"/>
-              <a:t>2025/11/5</a:t>
+              <a:t>2025/11/6</a:t>
             </a:fld>
             <a:endParaRPr lang="zh-CN" altLang="en-US"/>
           </a:p>
@@ -859,7 +1551,7 @@
           <a:p>
             <a:fld id="{FE49BBF5-53D3-44FC-8C3B-D3DD809837B3}" type="datetimeFigureOut">
               <a:rPr lang="zh-CN" altLang="en-US" smtClean="0"/>
-              <a:t>2025/11/5</a:t>
+              <a:t>2025/11/6</a:t>
             </a:fld>
             <a:endParaRPr lang="zh-CN" altLang="en-US"/>
           </a:p>
@@ -1134,7 +1826,7 @@
           <a:p>
             <a:fld id="{FE49BBF5-53D3-44FC-8C3B-D3DD809837B3}" type="datetimeFigureOut">
               <a:rPr lang="zh-CN" altLang="en-US" smtClean="0"/>
-              <a:t>2025/11/5</a:t>
+              <a:t>2025/11/6</a:t>
             </a:fld>
             <a:endParaRPr lang="zh-CN" altLang="en-US"/>
           </a:p>
@@ -1399,7 +2091,7 @@
           <a:p>
             <a:fld id="{FE49BBF5-53D3-44FC-8C3B-D3DD809837B3}" type="datetimeFigureOut">
               <a:rPr lang="zh-CN" altLang="en-US" smtClean="0"/>
-              <a:t>2025/11/5</a:t>
+              <a:t>2025/11/6</a:t>
             </a:fld>
             <a:endParaRPr lang="zh-CN" altLang="en-US"/>
           </a:p>
@@ -1811,7 +2503,7 @@
           <a:p>
             <a:fld id="{FE49BBF5-53D3-44FC-8C3B-D3DD809837B3}" type="datetimeFigureOut">
               <a:rPr lang="zh-CN" altLang="en-US" smtClean="0"/>
-              <a:t>2025/11/5</a:t>
+              <a:t>2025/11/6</a:t>
             </a:fld>
             <a:endParaRPr lang="zh-CN" altLang="en-US"/>
           </a:p>
@@ -1952,7 +2644,7 @@
           <a:p>
             <a:fld id="{FE49BBF5-53D3-44FC-8C3B-D3DD809837B3}" type="datetimeFigureOut">
               <a:rPr lang="zh-CN" altLang="en-US" smtClean="0"/>
-              <a:t>2025/11/5</a:t>
+              <a:t>2025/11/6</a:t>
             </a:fld>
             <a:endParaRPr lang="zh-CN" altLang="en-US"/>
           </a:p>
@@ -2065,7 +2757,7 @@
           <a:p>
             <a:fld id="{FE49BBF5-53D3-44FC-8C3B-D3DD809837B3}" type="datetimeFigureOut">
               <a:rPr lang="zh-CN" altLang="en-US" smtClean="0"/>
-              <a:t>2025/11/5</a:t>
+              <a:t>2025/11/6</a:t>
             </a:fld>
             <a:endParaRPr lang="zh-CN" altLang="en-US"/>
           </a:p>
@@ -2376,7 +3068,7 @@
           <a:p>
             <a:fld id="{FE49BBF5-53D3-44FC-8C3B-D3DD809837B3}" type="datetimeFigureOut">
               <a:rPr lang="zh-CN" altLang="en-US" smtClean="0"/>
-              <a:t>2025/11/5</a:t>
+              <a:t>2025/11/6</a:t>
             </a:fld>
             <a:endParaRPr lang="zh-CN" altLang="en-US"/>
           </a:p>
@@ -2664,7 +3356,7 @@
           <a:p>
             <a:fld id="{FE49BBF5-53D3-44FC-8C3B-D3DD809837B3}" type="datetimeFigureOut">
               <a:rPr lang="zh-CN" altLang="en-US" smtClean="0"/>
-              <a:t>2025/11/5</a:t>
+              <a:t>2025/11/6</a:t>
             </a:fld>
             <a:endParaRPr lang="zh-CN" altLang="en-US"/>
           </a:p>
@@ -2905,7 +3597,7 @@
           <a:p>
             <a:fld id="{FE49BBF5-53D3-44FC-8C3B-D3DD809837B3}" type="datetimeFigureOut">
               <a:rPr lang="zh-CN" altLang="en-US" smtClean="0"/>
-              <a:t>2025/11/5</a:t>
+              <a:t>2025/11/6</a:t>
             </a:fld>
             <a:endParaRPr lang="zh-CN" altLang="en-US"/>
           </a:p>
@@ -3428,7 +4120,7 @@
           <p:nvPr/>
         </p:nvPicPr>
         <p:blipFill>
-          <a:blip r:embed="rId2">
+          <a:blip r:embed="rId3">
             <a:extLst>
               <a:ext uri="{28A0092B-C50C-407E-A947-70E740481C1C}">
                 <a14:useLocalDpi xmlns:a14="http://schemas.microsoft.com/office/drawing/2010/main" val="0"/>
@@ -3467,13 +4159,7 @@
   <p:cSld>
     <p:spTree>
       <p:nvGrpSpPr>
-        <p:cNvPr id="1" name="">
-          <a:extLst>
-            <a:ext uri="{FF2B5EF4-FFF2-40B4-BE49-F238E27FC236}">
-              <a16:creationId xmlns:a16="http://schemas.microsoft.com/office/drawing/2014/main" id="{B1B43C24-7DAB-57FD-6289-AA0B9A2A9AF1}"/>
-            </a:ext>
-          </a:extLst>
-        </p:cNvPr>
+        <p:cNvPr id="1" name=""/>
         <p:cNvGrpSpPr/>
         <p:nvPr/>
       </p:nvGrpSpPr>
@@ -3487,78 +4173,88 @@
       </p:grpSpPr>
       <p:sp>
         <p:nvSpPr>
-          <p:cNvPr id="2" name="标题 1">
-            <a:extLst>
-              <a:ext uri="{FF2B5EF4-FFF2-40B4-BE49-F238E27FC236}">
-                <a16:creationId xmlns:a16="http://schemas.microsoft.com/office/drawing/2014/main" id="{C206B4A5-67A2-25C8-4D0B-BCB71BA3F2AF}"/>
-              </a:ext>
-            </a:extLst>
-          </p:cNvPr>
-          <p:cNvSpPr>
-            <a:spLocks noGrp="1"/>
-          </p:cNvSpPr>
-          <p:nvPr>
-            <p:ph type="ctrTitle"/>
+          <p:cNvPr id="2" name="Title 1"/>
+          <p:cNvSpPr>
+            <a:spLocks noGrp="1"/>
+          </p:cNvSpPr>
+          <p:nvPr>
+            <p:ph type="title"/>
           </p:nvPr>
         </p:nvSpPr>
         <p:spPr>
           <a:xfrm>
-            <a:off x="581892" y="375156"/>
-            <a:ext cx="6520872" cy="1430554"/>
+            <a:off x="838200" y="540255"/>
+            <a:ext cx="10515600" cy="1325563"/>
           </a:xfrm>
         </p:spPr>
         <p:txBody>
-          <a:bodyPr>
-            <a:normAutofit/>
-          </a:bodyPr>
-          <a:lstStyle/>
-          <a:p>
-            <a:endParaRPr lang="zh-CN" altLang="en-US" sz="5000" dirty="0">
-              <a:latin typeface="Arial" panose="020B0604020202020204" pitchFamily="34" charset="0"/>
-              <a:cs typeface="Arial" panose="020B0604020202020204" pitchFamily="34" charset="0"/>
-            </a:endParaRPr>
-          </a:p>
-        </p:txBody>
-      </p:sp>
-      <p:sp>
-        <p:nvSpPr>
-          <p:cNvPr id="3" name="副标题 2">
-            <a:extLst>
-              <a:ext uri="{FF2B5EF4-FFF2-40B4-BE49-F238E27FC236}">
-                <a16:creationId xmlns:a16="http://schemas.microsoft.com/office/drawing/2014/main" id="{A56A32A9-48B6-8A77-83AE-21A527693A57}"/>
-              </a:ext>
-            </a:extLst>
-          </p:cNvPr>
-          <p:cNvSpPr>
-            <a:spLocks noGrp="1"/>
-          </p:cNvSpPr>
-          <p:nvPr>
-            <p:ph type="subTitle" idx="1"/>
+          <a:bodyPr/>
+          <a:lstStyle/>
+          <a:p>
+            <a:r>
+              <a:rPr dirty="0">
+                <a:latin typeface="Arial" panose="020B0604020202020204" pitchFamily="34" charset="0"/>
+                <a:cs typeface="Arial" panose="020B0604020202020204" pitchFamily="34" charset="0"/>
+              </a:rPr>
+              <a:t>Why &amp; What</a:t>
+            </a:r>
+          </a:p>
+        </p:txBody>
+      </p:sp>
+      <p:sp>
+        <p:nvSpPr>
+          <p:cNvPr id="3" name="Content Placeholder 2"/>
+          <p:cNvSpPr>
+            <a:spLocks noGrp="1"/>
+          </p:cNvSpPr>
+          <p:nvPr>
+            <p:ph idx="1"/>
           </p:nvPr>
         </p:nvSpPr>
         <p:spPr>
           <a:xfrm>
-            <a:off x="1265382" y="3396529"/>
-            <a:ext cx="9144000" cy="1655762"/>
+            <a:off x="838200" y="2141537"/>
+            <a:ext cx="10515600" cy="4351338"/>
           </a:xfrm>
         </p:spPr>
         <p:txBody>
           <a:bodyPr/>
           <a:lstStyle/>
           <a:p>
-            <a:endParaRPr lang="zh-CN" altLang="en-US" dirty="0">
-              <a:latin typeface="Arial" panose="020B0604020202020204" pitchFamily="34" charset="0"/>
-              <a:cs typeface="Arial" panose="020B0604020202020204" pitchFamily="34" charset="0"/>
-            </a:endParaRPr>
+            <a:r>
+              <a:rPr dirty="0">
+                <a:latin typeface="Arial" panose="020B0604020202020204" pitchFamily="34" charset="0"/>
+                <a:cs typeface="Arial" panose="020B0604020202020204" pitchFamily="34" charset="0"/>
+              </a:rPr>
+              <a:t>- Hands‑free interaction</a:t>
+            </a:r>
+          </a:p>
+          <a:p>
+            <a:r>
+              <a:rPr dirty="0">
+                <a:latin typeface="Arial" panose="020B0604020202020204" pitchFamily="34" charset="0"/>
+                <a:cs typeface="Arial" panose="020B0604020202020204" pitchFamily="34" charset="0"/>
+              </a:rPr>
+              <a:t>- Fully on-device processing</a:t>
+            </a:r>
+          </a:p>
+          <a:p>
+            <a:r>
+              <a:rPr dirty="0">
+                <a:latin typeface="Arial" panose="020B0604020202020204" pitchFamily="34" charset="0"/>
+                <a:cs typeface="Arial" panose="020B0604020202020204" pitchFamily="34" charset="0"/>
+              </a:rPr>
+              <a:t>- No cloud or GPU required</a:t>
+            </a:r>
           </a:p>
         </p:txBody>
       </p:sp>
       <p:pic>
         <p:nvPicPr>
-          <p:cNvPr id="5" name="图片 4" descr="徽标&#10;&#10;AI 生成的内容可能不正确。">
-            <a:extLst>
-              <a:ext uri="{FF2B5EF4-FFF2-40B4-BE49-F238E27FC236}">
-                <a16:creationId xmlns:a16="http://schemas.microsoft.com/office/drawing/2014/main" id="{687C8CC7-855F-666A-AC97-8CDCC59B5434}"/>
+          <p:cNvPr id="4" name="图片 3" descr="徽标&#10;&#10;AI 生成的内容可能不正确。">
+            <a:extLst>
+              <a:ext uri="{FF2B5EF4-FFF2-40B4-BE49-F238E27FC236}">
+                <a16:creationId xmlns:a16="http://schemas.microsoft.com/office/drawing/2014/main" id="{31100576-4C20-F463-FD95-39F9C03E353B}"/>
               </a:ext>
             </a:extLst>
           </p:cNvPr>
@@ -3568,7 +4264,7 @@
           <p:nvPr/>
         </p:nvPicPr>
         <p:blipFill>
-          <a:blip r:embed="rId2">
+          <a:blip r:embed="rId3">
             <a:extLst>
               <a:ext uri="{28A0092B-C50C-407E-A947-70E740481C1C}">
                 <a14:useLocalDpi xmlns:a14="http://schemas.microsoft.com/office/drawing/2010/main" val="0"/>
@@ -3590,11 +4286,184 @@
         </p:spPr>
       </p:pic>
     </p:spTree>
-    <p:extLst>
-      <p:ext uri="{BB962C8B-B14F-4D97-AF65-F5344CB8AC3E}">
-        <p14:creationId xmlns:p14="http://schemas.microsoft.com/office/powerpoint/2010/main" val="1949508291"/>
-      </p:ext>
-    </p:extLst>
+  </p:cSld>
+  <p:clrMapOvr>
+    <a:masterClrMapping/>
+  </p:clrMapOvr>
+</p:sld>
+</file>
+
+<file path=ppt/slides/slide3.xml><?xml version="1.0" encoding="utf-8"?>
+<p:sld xmlns:a="http://schemas.openxmlformats.org/drawingml/2006/main" xmlns:r="http://schemas.openxmlformats.org/officeDocument/2006/relationships" xmlns:p="http://schemas.openxmlformats.org/presentationml/2006/main">
+  <p:cSld>
+    <p:spTree>
+      <p:nvGrpSpPr>
+        <p:cNvPr id="1" name=""/>
+        <p:cNvGrpSpPr/>
+        <p:nvPr/>
+      </p:nvGrpSpPr>
+      <p:grpSpPr>
+        <a:xfrm>
+          <a:off x="0" y="0"/>
+          <a:ext cx="0" cy="0"/>
+          <a:chOff x="0" y="0"/>
+          <a:chExt cx="0" cy="0"/>
+        </a:xfrm>
+      </p:grpSpPr>
+      <p:sp>
+        <p:nvSpPr>
+          <p:cNvPr id="2" name="Title 1"/>
+          <p:cNvSpPr>
+            <a:spLocks noGrp="1"/>
+          </p:cNvSpPr>
+          <p:nvPr>
+            <p:ph type="title"/>
+          </p:nvPr>
+        </p:nvSpPr>
+        <p:spPr/>
+        <p:txBody>
+          <a:bodyPr/>
+          <a:lstStyle/>
+          <a:p>
+            <a:r>
+              <a:rPr lang="en-US" dirty="0">
+                <a:latin typeface="Arial" panose="020B0604020202020204" pitchFamily="34" charset="0"/>
+                <a:cs typeface="Arial" panose="020B0604020202020204" pitchFamily="34" charset="0"/>
+              </a:rPr>
+              <a:t>M</a:t>
+            </a:r>
+            <a:r>
+              <a:rPr lang="en-US" altLang="zh-CN" dirty="0">
+                <a:latin typeface="Arial" panose="020B0604020202020204" pitchFamily="34" charset="0"/>
+                <a:cs typeface="Arial" panose="020B0604020202020204" pitchFamily="34" charset="0"/>
+              </a:rPr>
+              <a:t>ethod</a:t>
+            </a:r>
+            <a:endParaRPr dirty="0">
+              <a:latin typeface="Arial" panose="020B0604020202020204" pitchFamily="34" charset="0"/>
+              <a:cs typeface="Arial" panose="020B0604020202020204" pitchFamily="34" charset="0"/>
+            </a:endParaRPr>
+          </a:p>
+        </p:txBody>
+      </p:sp>
+      <p:sp>
+        <p:nvSpPr>
+          <p:cNvPr id="3" name="Content Placeholder 2"/>
+          <p:cNvSpPr>
+            <a:spLocks noGrp="1"/>
+          </p:cNvSpPr>
+          <p:nvPr>
+            <p:ph idx="1"/>
+          </p:nvPr>
+        </p:nvSpPr>
+        <p:spPr/>
+        <p:txBody>
+          <a:bodyPr/>
+          <a:lstStyle/>
+          <a:p>
+            <a:r>
+              <a:rPr dirty="0">
+                <a:latin typeface="Arial" panose="020B0604020202020204" pitchFamily="34" charset="0"/>
+                <a:cs typeface="Arial" panose="020B0604020202020204" pitchFamily="34" charset="0"/>
+              </a:rPr>
+              <a:t>Camera → </a:t>
+            </a:r>
+            <a:r>
+              <a:rPr dirty="0" err="1">
+                <a:latin typeface="Arial" panose="020B0604020202020204" pitchFamily="34" charset="0"/>
+                <a:cs typeface="Arial" panose="020B0604020202020204" pitchFamily="34" charset="0"/>
+              </a:rPr>
+              <a:t>TinyML</a:t>
+            </a:r>
+            <a:r>
+              <a:rPr dirty="0">
+                <a:latin typeface="Arial" panose="020B0604020202020204" pitchFamily="34" charset="0"/>
+                <a:cs typeface="Arial" panose="020B0604020202020204" pitchFamily="34" charset="0"/>
+              </a:rPr>
+              <a:t> Model → Output</a:t>
+            </a:r>
+          </a:p>
+          <a:p>
+            <a:endParaRPr dirty="0">
+              <a:latin typeface="Arial" panose="020B0604020202020204" pitchFamily="34" charset="0"/>
+              <a:cs typeface="Arial" panose="020B0604020202020204" pitchFamily="34" charset="0"/>
+            </a:endParaRPr>
+          </a:p>
+          <a:p>
+            <a:r>
+              <a:rPr dirty="0">
+                <a:latin typeface="Arial" panose="020B0604020202020204" pitchFamily="34" charset="0"/>
+                <a:cs typeface="Arial" panose="020B0604020202020204" pitchFamily="34" charset="0"/>
+              </a:rPr>
+              <a:t>Targets:</a:t>
+            </a:r>
+          </a:p>
+          <a:p>
+            <a:r>
+              <a:rPr dirty="0">
+                <a:latin typeface="Arial" panose="020B0604020202020204" pitchFamily="34" charset="0"/>
+                <a:cs typeface="Arial" panose="020B0604020202020204" pitchFamily="34" charset="0"/>
+              </a:rPr>
+              <a:t>• ≥3 gestures</a:t>
+            </a:r>
+          </a:p>
+          <a:p>
+            <a:r>
+              <a:rPr dirty="0">
+                <a:latin typeface="Arial" panose="020B0604020202020204" pitchFamily="34" charset="0"/>
+                <a:cs typeface="Arial" panose="020B0604020202020204" pitchFamily="34" charset="0"/>
+              </a:rPr>
+              <a:t>• ≥10 FPS</a:t>
+            </a:r>
+          </a:p>
+          <a:p>
+            <a:r>
+              <a:rPr dirty="0">
+                <a:latin typeface="Arial" panose="020B0604020202020204" pitchFamily="34" charset="0"/>
+                <a:cs typeface="Arial" panose="020B0604020202020204" pitchFamily="34" charset="0"/>
+              </a:rPr>
+              <a:t>• ≤500 KB model size</a:t>
+            </a:r>
+          </a:p>
+        </p:txBody>
+      </p:sp>
+      <p:pic>
+        <p:nvPicPr>
+          <p:cNvPr id="4" name="图片 3" descr="徽标&#10;&#10;AI 生成的内容可能不正确。">
+            <a:extLst>
+              <a:ext uri="{FF2B5EF4-FFF2-40B4-BE49-F238E27FC236}">
+                <a16:creationId xmlns:a16="http://schemas.microsoft.com/office/drawing/2014/main" id="{0EB86D0E-B3FC-075B-FF15-FB0E9AA88486}"/>
+              </a:ext>
+            </a:extLst>
+          </p:cNvPr>
+          <p:cNvPicPr>
+            <a:picLocks noChangeAspect="1"/>
+          </p:cNvPicPr>
+          <p:nvPr/>
+        </p:nvPicPr>
+        <p:blipFill>
+          <a:blip r:embed="rId3">
+            <a:extLst>
+              <a:ext uri="{28A0092B-C50C-407E-A947-70E740481C1C}">
+                <a14:useLocalDpi xmlns:a14="http://schemas.microsoft.com/office/drawing/2010/main" val="0"/>
+              </a:ext>
+            </a:extLst>
+          </a:blip>
+          <a:stretch>
+            <a:fillRect/>
+          </a:stretch>
+        </p:blipFill>
+        <p:spPr>
+          <a:xfrm>
+            <a:off x="10289310" y="247074"/>
+            <a:ext cx="1699489" cy="955963"/>
+          </a:xfrm>
+          <a:prstGeom prst="rect">
+            <a:avLst/>
+          </a:prstGeom>
+        </p:spPr>
+      </p:pic>
+    </p:spTree>
   </p:cSld>
   <p:clrMapOvr>
     <a:masterClrMapping/>
@@ -3915,4 +4784,319 @@
     </a:ext>
   </a:extLst>
 </a:theme>
+</file>
+
+<file path=ppt/theme/theme2.xml><?xml version="1.0" encoding="utf-8"?>
+<a:theme xmlns:a="http://schemas.openxmlformats.org/drawingml/2006/main" name="Office 主题​​">
+  <a:themeElements>
+    <a:clrScheme name="Office">
+      <a:dk1>
+        <a:sysClr val="windowText" lastClr="000000"/>
+      </a:dk1>
+      <a:lt1>
+        <a:sysClr val="window" lastClr="FFFFFF"/>
+      </a:lt1>
+      <a:dk2>
+        <a:srgbClr val="0E2841"/>
+      </a:dk2>
+      <a:lt2>
+        <a:srgbClr val="E8E8E8"/>
+      </a:lt2>
+      <a:accent1>
+        <a:srgbClr val="156082"/>
+      </a:accent1>
+      <a:accent2>
+        <a:srgbClr val="E97132"/>
+      </a:accent2>
+      <a:accent3>
+        <a:srgbClr val="196B24"/>
+      </a:accent3>
+      <a:accent4>
+        <a:srgbClr val="0F9ED5"/>
+      </a:accent4>
+      <a:accent5>
+        <a:srgbClr val="A02B93"/>
+      </a:accent5>
+      <a:accent6>
+        <a:srgbClr val="4EA72E"/>
+      </a:accent6>
+      <a:hlink>
+        <a:srgbClr val="467886"/>
+      </a:hlink>
+      <a:folHlink>
+        <a:srgbClr val="96607D"/>
+      </a:folHlink>
+    </a:clrScheme>
+    <a:fontScheme name="Office">
+      <a:majorFont>
+        <a:latin typeface="等线 Light" panose="02110004020202020204"/>
+        <a:ea typeface=""/>
+        <a:cs typeface=""/>
+        <a:font script="Jpan" typeface="游ゴシック Light"/>
+        <a:font script="Hang" typeface="맑은 고딕"/>
+        <a:font script="Hans" typeface="等线 Light"/>
+        <a:font script="Hant" typeface="新細明體"/>
+        <a:font script="Arab" typeface="Times New Roman"/>
+        <a:font script="Hebr" typeface="Times New Roman"/>
+        <a:font script="Thai" typeface="Angsana New"/>
+        <a:font script="Ethi" typeface="Nyala"/>
+        <a:font script="Beng" typeface="Vrinda"/>
+        <a:font script="Gujr" typeface="Shruti"/>
+        <a:font script="Khmr" typeface="MoolBoran"/>
+        <a:font script="Knda" typeface="Tunga"/>
+        <a:font script="Guru" typeface="Raavi"/>
+        <a:font script="Cans" typeface="Euphemia"/>
+        <a:font script="Cher" typeface="Plantagenet Cherokee"/>
+        <a:font script="Yiii" typeface="Microsoft Yi Baiti"/>
+        <a:font script="Tibt" typeface="Microsoft Himalaya"/>
+        <a:font script="Thaa" typeface="MV Boli"/>
+        <a:font script="Deva" typeface="Mangal"/>
+        <a:font script="Telu" typeface="Gautami"/>
+        <a:font script="Taml" typeface="Latha"/>
+        <a:font script="Syrc" typeface="Estrangelo Edessa"/>
+        <a:font script="Orya" typeface="Kalinga"/>
+        <a:font script="Mlym" typeface="Kartika"/>
+        <a:font script="Laoo" typeface="DokChampa"/>
+        <a:font script="Sinh" typeface="Iskoola Pota"/>
+        <a:font script="Mong" typeface="Mongolian Baiti"/>
+        <a:font script="Viet" typeface="Times New Roman"/>
+        <a:font script="Uigh" typeface="Microsoft Uighur"/>
+        <a:font script="Geor" typeface="Sylfaen"/>
+        <a:font script="Armn" typeface="Arial"/>
+        <a:font script="Bugi" typeface="Leelawadee UI"/>
+        <a:font script="Bopo" typeface="Microsoft JhengHei"/>
+        <a:font script="Java" typeface="Javanese Text"/>
+        <a:font script="Lisu" typeface="Segoe UI"/>
+        <a:font script="Mymr" typeface="Myanmar Text"/>
+        <a:font script="Nkoo" typeface="Ebrima"/>
+        <a:font script="Olck" typeface="Nirmala UI"/>
+        <a:font script="Osma" typeface="Ebrima"/>
+        <a:font script="Phag" typeface="Phagspa"/>
+        <a:font script="Syrn" typeface="Estrangelo Edessa"/>
+        <a:font script="Syrj" typeface="Estrangelo Edessa"/>
+        <a:font script="Syre" typeface="Estrangelo Edessa"/>
+        <a:font script="Sora" typeface="Nirmala UI"/>
+        <a:font script="Tale" typeface="Microsoft Tai Le"/>
+        <a:font script="Talu" typeface="Microsoft New Tai Lue"/>
+        <a:font script="Tfng" typeface="Ebrima"/>
+      </a:majorFont>
+      <a:minorFont>
+        <a:latin typeface="等线" panose="02110004020202020204"/>
+        <a:ea typeface=""/>
+        <a:cs typeface=""/>
+        <a:font script="Jpan" typeface="游ゴシック"/>
+        <a:font script="Hang" typeface="맑은 고딕"/>
+        <a:font script="Hans" typeface="等线"/>
+        <a:font script="Hant" typeface="新細明體"/>
+        <a:font script="Arab" typeface="Arial"/>
+        <a:font script="Hebr" typeface="Arial"/>
+        <a:font script="Thai" typeface="Cordia New"/>
+        <a:font script="Ethi" typeface="Nyala"/>
+        <a:font script="Beng" typeface="Vrinda"/>
+        <a:font script="Gujr" typeface="Shruti"/>
+        <a:font script="Khmr" typeface="DaunPenh"/>
+        <a:font script="Knda" typeface="Tunga"/>
+        <a:font script="Guru" typeface="Raavi"/>
+        <a:font script="Cans" typeface="Euphemia"/>
+        <a:font script="Cher" typeface="Plantagenet Cherokee"/>
+        <a:font script="Yiii" typeface="Microsoft Yi Baiti"/>
+        <a:font script="Tibt" typeface="Microsoft Himalaya"/>
+        <a:font script="Thaa" typeface="MV Boli"/>
+        <a:font script="Deva" typeface="Mangal"/>
+        <a:font script="Telu" typeface="Gautami"/>
+        <a:font script="Taml" typeface="Latha"/>
+        <a:font script="Syrc" typeface="Estrangelo Edessa"/>
+        <a:font script="Orya" typeface="Kalinga"/>
+        <a:font script="Mlym" typeface="Kartika"/>
+        <a:font script="Laoo" typeface="DokChampa"/>
+        <a:font script="Sinh" typeface="Iskoola Pota"/>
+        <a:font script="Mong" typeface="Mongolian Baiti"/>
+        <a:font script="Viet" typeface="Arial"/>
+        <a:font script="Uigh" typeface="Microsoft Uighur"/>
+        <a:font script="Geor" typeface="Sylfaen"/>
+        <a:font script="Armn" typeface="Arial"/>
+        <a:font script="Bugi" typeface="Leelawadee UI"/>
+        <a:font script="Bopo" typeface="Microsoft JhengHei"/>
+        <a:font script="Java" typeface="Javanese Text"/>
+        <a:font script="Lisu" typeface="Segoe UI"/>
+        <a:font script="Mymr" typeface="Myanmar Text"/>
+        <a:font script="Nkoo" typeface="Ebrima"/>
+        <a:font script="Olck" typeface="Nirmala UI"/>
+        <a:font script="Osma" typeface="Ebrima"/>
+        <a:font script="Phag" typeface="Phagspa"/>
+        <a:font script="Syrn" typeface="Estrangelo Edessa"/>
+        <a:font script="Syrj" typeface="Estrangelo Edessa"/>
+        <a:font script="Syre" typeface="Estrangelo Edessa"/>
+        <a:font script="Sora" typeface="Nirmala UI"/>
+        <a:font script="Tale" typeface="Microsoft Tai Le"/>
+        <a:font script="Talu" typeface="Microsoft New Tai Lue"/>
+        <a:font script="Tfng" typeface="Ebrima"/>
+      </a:minorFont>
+    </a:fontScheme>
+    <a:fmtScheme name="Office">
+      <a:fillStyleLst>
+        <a:solidFill>
+          <a:schemeClr val="phClr"/>
+        </a:solidFill>
+        <a:gradFill rotWithShape="1">
+          <a:gsLst>
+            <a:gs pos="0">
+              <a:schemeClr val="phClr">
+                <a:lumMod val="110000"/>
+                <a:satMod val="105000"/>
+                <a:tint val="67000"/>
+              </a:schemeClr>
+            </a:gs>
+            <a:gs pos="50000">
+              <a:schemeClr val="phClr">
+                <a:lumMod val="105000"/>
+                <a:satMod val="103000"/>
+                <a:tint val="73000"/>
+              </a:schemeClr>
+            </a:gs>
+            <a:gs pos="100000">
+              <a:schemeClr val="phClr">
+                <a:lumMod val="105000"/>
+                <a:satMod val="109000"/>
+                <a:tint val="81000"/>
+              </a:schemeClr>
+            </a:gs>
+          </a:gsLst>
+          <a:lin ang="5400000" scaled="0"/>
+        </a:gradFill>
+        <a:gradFill rotWithShape="1">
+          <a:gsLst>
+            <a:gs pos="0">
+              <a:schemeClr val="phClr">
+                <a:satMod val="103000"/>
+                <a:lumMod val="102000"/>
+                <a:tint val="94000"/>
+              </a:schemeClr>
+            </a:gs>
+            <a:gs pos="50000">
+              <a:schemeClr val="phClr">
+                <a:satMod val="110000"/>
+                <a:lumMod val="100000"/>
+                <a:shade val="100000"/>
+              </a:schemeClr>
+            </a:gs>
+            <a:gs pos="100000">
+              <a:schemeClr val="phClr">
+                <a:lumMod val="99000"/>
+                <a:satMod val="120000"/>
+                <a:shade val="78000"/>
+              </a:schemeClr>
+            </a:gs>
+          </a:gsLst>
+          <a:lin ang="5400000" scaled="0"/>
+        </a:gradFill>
+      </a:fillStyleLst>
+      <a:lnStyleLst>
+        <a:ln w="12700" cap="flat" cmpd="sng" algn="ctr">
+          <a:solidFill>
+            <a:schemeClr val="phClr"/>
+          </a:solidFill>
+          <a:prstDash val="solid"/>
+          <a:miter lim="800000"/>
+        </a:ln>
+        <a:ln w="19050" cap="flat" cmpd="sng" algn="ctr">
+          <a:solidFill>
+            <a:schemeClr val="phClr"/>
+          </a:solidFill>
+          <a:prstDash val="solid"/>
+          <a:miter lim="800000"/>
+        </a:ln>
+        <a:ln w="25400" cap="flat" cmpd="sng" algn="ctr">
+          <a:solidFill>
+            <a:schemeClr val="phClr"/>
+          </a:solidFill>
+          <a:prstDash val="solid"/>
+          <a:miter lim="800000"/>
+        </a:ln>
+      </a:lnStyleLst>
+      <a:effectStyleLst>
+        <a:effectStyle>
+          <a:effectLst/>
+        </a:effectStyle>
+        <a:effectStyle>
+          <a:effectLst/>
+        </a:effectStyle>
+        <a:effectStyle>
+          <a:effectLst>
+            <a:outerShdw blurRad="57150" dist="19050" dir="5400000" algn="ctr" rotWithShape="0">
+              <a:srgbClr val="000000">
+                <a:alpha val="63000"/>
+              </a:srgbClr>
+            </a:outerShdw>
+          </a:effectLst>
+        </a:effectStyle>
+      </a:effectStyleLst>
+      <a:bgFillStyleLst>
+        <a:solidFill>
+          <a:schemeClr val="phClr"/>
+        </a:solidFill>
+        <a:solidFill>
+          <a:schemeClr val="phClr">
+            <a:tint val="95000"/>
+            <a:satMod val="170000"/>
+          </a:schemeClr>
+        </a:solidFill>
+        <a:gradFill rotWithShape="1">
+          <a:gsLst>
+            <a:gs pos="0">
+              <a:schemeClr val="phClr">
+                <a:tint val="93000"/>
+                <a:satMod val="150000"/>
+                <a:shade val="98000"/>
+                <a:lumMod val="102000"/>
+              </a:schemeClr>
+            </a:gs>
+            <a:gs pos="50000">
+              <a:schemeClr val="phClr">
+                <a:tint val="98000"/>
+                <a:satMod val="130000"/>
+                <a:shade val="90000"/>
+                <a:lumMod val="103000"/>
+              </a:schemeClr>
+            </a:gs>
+            <a:gs pos="100000">
+              <a:schemeClr val="phClr">
+                <a:shade val="63000"/>
+                <a:satMod val="120000"/>
+              </a:schemeClr>
+            </a:gs>
+          </a:gsLst>
+          <a:lin ang="5400000" scaled="0"/>
+        </a:gradFill>
+      </a:bgFillStyleLst>
+    </a:fmtScheme>
+  </a:themeElements>
+  <a:objectDefaults>
+    <a:lnDef>
+      <a:spPr/>
+      <a:bodyPr/>
+      <a:lstStyle/>
+      <a:style>
+        <a:lnRef idx="2">
+          <a:schemeClr val="accent1"/>
+        </a:lnRef>
+        <a:fillRef idx="0">
+          <a:schemeClr val="accent1"/>
+        </a:fillRef>
+        <a:effectRef idx="1">
+          <a:schemeClr val="accent1"/>
+        </a:effectRef>
+        <a:fontRef idx="minor">
+          <a:schemeClr val="tx1"/>
+        </a:fontRef>
+      </a:style>
+    </a:lnDef>
+  </a:objectDefaults>
+  <a:extraClrSchemeLst/>
+  <a:extLst>
+    <a:ext uri="{05A4C25C-085E-4340-85A3-A5531E510DB2}">
+      <thm15:themeFamily xmlns:thm15="http://schemas.microsoft.com/office/thememl/2012/main" name="Office Theme" id="{2E142A2C-CD16-42D6-873A-C26D2A0506FA}" vid="{1BDDFF52-6CD6-40A5-AB3C-68EB2F1E4D0A}"/>
+    </a:ext>
+  </a:extLst>
+</a:theme>
 </file>
</xml_diff>